<commit_message>
added Fake Reviews slides to presentation
</commit_message>
<xml_diff>
--- a/Documentation/My documentation/Predzashita_Gailevich.pptx
+++ b/Documentation/My documentation/Predzashita_Gailevich.pptx
@@ -5,7 +5,7 @@
     <p:sldMasterId id="2147483648" r:id="rId1"/>
   </p:sldMasterIdLst>
   <p:notesMasterIdLst>
-    <p:notesMasterId r:id="rId22"/>
+    <p:notesMasterId r:id="rId24"/>
   </p:notesMasterIdLst>
   <p:sldIdLst>
     <p:sldId id="270" r:id="rId2"/>
@@ -16,18 +16,20 @@
     <p:sldId id="271" r:id="rId7"/>
     <p:sldId id="268" r:id="rId8"/>
     <p:sldId id="262" r:id="rId9"/>
-    <p:sldId id="267" r:id="rId10"/>
-    <p:sldId id="273" r:id="rId11"/>
-    <p:sldId id="263" r:id="rId12"/>
-    <p:sldId id="264" r:id="rId13"/>
-    <p:sldId id="275" r:id="rId14"/>
-    <p:sldId id="265" r:id="rId15"/>
-    <p:sldId id="266" r:id="rId16"/>
-    <p:sldId id="278" r:id="rId17"/>
-    <p:sldId id="280" r:id="rId18"/>
-    <p:sldId id="279" r:id="rId19"/>
-    <p:sldId id="277" r:id="rId20"/>
-    <p:sldId id="272" r:id="rId21"/>
+    <p:sldId id="282" r:id="rId10"/>
+    <p:sldId id="281" r:id="rId11"/>
+    <p:sldId id="267" r:id="rId12"/>
+    <p:sldId id="273" r:id="rId13"/>
+    <p:sldId id="263" r:id="rId14"/>
+    <p:sldId id="264" r:id="rId15"/>
+    <p:sldId id="275" r:id="rId16"/>
+    <p:sldId id="265" r:id="rId17"/>
+    <p:sldId id="266" r:id="rId18"/>
+    <p:sldId id="278" r:id="rId19"/>
+    <p:sldId id="280" r:id="rId20"/>
+    <p:sldId id="279" r:id="rId21"/>
+    <p:sldId id="277" r:id="rId22"/>
+    <p:sldId id="272" r:id="rId23"/>
   </p:sldIdLst>
   <p:sldSz cx="9144000" cy="6858000" type="screen4x3"/>
   <p:notesSz cx="6858000" cy="9144000"/>
@@ -3678,6 +3680,484 @@
 </file>
 
 <file path=ppt/slides/slide10.xml><?xml version="1.0" encoding="utf-8"?>
+<p:sld xmlns:a="http://schemas.openxmlformats.org/drawingml/2006/main" xmlns:r="http://schemas.openxmlformats.org/officeDocument/2006/relationships" xmlns:p="http://schemas.openxmlformats.org/presentationml/2006/main">
+  <p:cSld>
+    <p:spTree>
+      <p:nvGrpSpPr>
+        <p:cNvPr id="1" name=""/>
+        <p:cNvGrpSpPr/>
+        <p:nvPr/>
+      </p:nvGrpSpPr>
+      <p:grpSpPr>
+        <a:xfrm>
+          <a:off x="0" y="0"/>
+          <a:ext cx="0" cy="0"/>
+          <a:chOff x="0" y="0"/>
+          <a:chExt cx="0" cy="0"/>
+        </a:xfrm>
+      </p:grpSpPr>
+      <p:sp>
+        <p:nvSpPr>
+          <p:cNvPr id="2" name="Заголовок 1"/>
+          <p:cNvSpPr>
+            <a:spLocks noGrp="1"/>
+          </p:cNvSpPr>
+          <p:nvPr>
+            <p:ph type="ctrTitle"/>
+          </p:nvPr>
+        </p:nvSpPr>
+        <p:spPr>
+          <a:xfrm>
+            <a:off x="467544" y="188640"/>
+            <a:ext cx="8136904" cy="1440160"/>
+          </a:xfrm>
+        </p:spPr>
+        <p:txBody>
+          <a:bodyPr>
+            <a:normAutofit/>
+          </a:bodyPr>
+          <a:lstStyle/>
+          <a:p>
+            <a:r>
+              <a:rPr lang="ru-RU" dirty="0"/>
+              <a:t>Предлагаемое решение</a:t>
+            </a:r>
+            <a:br>
+              <a:rPr lang="ru-RU" dirty="0"/>
+            </a:br>
+            <a:r>
+              <a:rPr lang="ru-RU" dirty="0"/>
+              <a:t>(Ложные отзывы)</a:t>
+            </a:r>
+          </a:p>
+        </p:txBody>
+      </p:sp>
+      <p:sp>
+        <p:nvSpPr>
+          <p:cNvPr id="4" name="Номер слайда 3">
+            <a:extLst>
+              <a:ext uri="{FF2B5EF4-FFF2-40B4-BE49-F238E27FC236}">
+                <a16:creationId xmlns:a16="http://schemas.microsoft.com/office/drawing/2014/main" id="{FADEFAFE-1386-B458-4D20-8526F8503760}"/>
+              </a:ext>
+            </a:extLst>
+          </p:cNvPr>
+          <p:cNvSpPr>
+            <a:spLocks noGrp="1"/>
+          </p:cNvSpPr>
+          <p:nvPr>
+            <p:ph type="sldNum" sz="quarter" idx="12"/>
+          </p:nvPr>
+        </p:nvSpPr>
+        <p:spPr/>
+        <p:txBody>
+          <a:bodyPr/>
+          <a:lstStyle/>
+          <a:p>
+            <a:fld id="{A8D4CE12-0AFA-4111-B533-B38A2B9BBD8D}" type="slidenum">
+              <a:rPr lang="ru-RU" smtClean="0"/>
+              <a:t>10</a:t>
+            </a:fld>
+            <a:endParaRPr lang="ru-RU"/>
+          </a:p>
+        </p:txBody>
+      </p:sp>
+      <p:sp>
+        <p:nvSpPr>
+          <p:cNvPr id="6" name="TextBox 5">
+            <a:extLst>
+              <a:ext uri="{FF2B5EF4-FFF2-40B4-BE49-F238E27FC236}">
+                <a16:creationId xmlns:a16="http://schemas.microsoft.com/office/drawing/2014/main" id="{43735435-8581-9D15-EDE8-C50A0F10684C}"/>
+              </a:ext>
+            </a:extLst>
+          </p:cNvPr>
+          <p:cNvSpPr txBox="1"/>
+          <p:nvPr/>
+        </p:nvSpPr>
+        <p:spPr>
+          <a:xfrm>
+            <a:off x="1619672" y="1988840"/>
+            <a:ext cx="6408712" cy="2814617"/>
+          </a:xfrm>
+          <a:prstGeom prst="rect">
+            <a:avLst/>
+          </a:prstGeom>
+          <a:noFill/>
+        </p:spPr>
+        <p:txBody>
+          <a:bodyPr wrap="square">
+            <a:spAutoFit/>
+          </a:bodyPr>
+          <a:lstStyle/>
+          <a:p>
+            <a:pPr marL="342900" indent="-342900">
+              <a:lnSpc>
+                <a:spcPct val="150000"/>
+              </a:lnSpc>
+              <a:buAutoNum type="arabicParenR"/>
+            </a:pPr>
+            <a:r>
+              <a:rPr lang="ru-RU" sz="2000" dirty="0">
+                <a:solidFill>
+                  <a:srgbClr val="0D0D0D"/>
+                </a:solidFill>
+                <a:highlight>
+                  <a:srgbClr val="FFFFFF"/>
+                </a:highlight>
+                <a:latin typeface="ui-sans-serif"/>
+              </a:rPr>
+              <a:t>Требование прикрепить к отзыву чек о предоставлении услуги для подтверждения достоверности отзыва</a:t>
+            </a:r>
+          </a:p>
+          <a:p>
+            <a:pPr marL="342900" indent="-342900">
+              <a:lnSpc>
+                <a:spcPct val="150000"/>
+              </a:lnSpc>
+              <a:buAutoNum type="arabicParenR"/>
+            </a:pPr>
+            <a:r>
+              <a:rPr lang="ru-RU" sz="2000" dirty="0">
+                <a:solidFill>
+                  <a:srgbClr val="0D0D0D"/>
+                </a:solidFill>
+                <a:highlight>
+                  <a:srgbClr val="FFFFFF"/>
+                </a:highlight>
+                <a:latin typeface="ui-sans-serif"/>
+              </a:rPr>
+              <a:t>Авторизация пользователя через Госуслуги</a:t>
+            </a:r>
+          </a:p>
+          <a:p>
+            <a:pPr marL="342900" indent="-342900">
+              <a:lnSpc>
+                <a:spcPct val="150000"/>
+              </a:lnSpc>
+              <a:buAutoNum type="arabicParenR"/>
+            </a:pPr>
+            <a:r>
+              <a:rPr lang="ru-RU" sz="2000" dirty="0">
+                <a:solidFill>
+                  <a:srgbClr val="0D0D0D"/>
+                </a:solidFill>
+                <a:highlight>
+                  <a:srgbClr val="FFFFFF"/>
+                </a:highlight>
+                <a:latin typeface="ui-sans-serif"/>
+              </a:rPr>
+              <a:t>Проверка администратором наличия прикрепленного чека и его соответствия с данными пользователя. </a:t>
+            </a:r>
+          </a:p>
+        </p:txBody>
+      </p:sp>
+    </p:spTree>
+    <p:extLst>
+      <p:ext uri="{BB962C8B-B14F-4D97-AF65-F5344CB8AC3E}">
+        <p14:creationId xmlns:p14="http://schemas.microsoft.com/office/powerpoint/2010/main" val="133201304"/>
+      </p:ext>
+    </p:extLst>
+  </p:cSld>
+  <p:clrMapOvr>
+    <a:masterClrMapping/>
+  </p:clrMapOvr>
+</p:sld>
+</file>
+
+<file path=ppt/slides/slide11.xml><?xml version="1.0" encoding="utf-8"?>
+<p:sld xmlns:a="http://schemas.openxmlformats.org/drawingml/2006/main" xmlns:r="http://schemas.openxmlformats.org/officeDocument/2006/relationships" xmlns:p="http://schemas.openxmlformats.org/presentationml/2006/main">
+  <p:cSld>
+    <p:spTree>
+      <p:nvGrpSpPr>
+        <p:cNvPr id="1" name=""/>
+        <p:cNvGrpSpPr/>
+        <p:nvPr/>
+      </p:nvGrpSpPr>
+      <p:grpSpPr>
+        <a:xfrm>
+          <a:off x="0" y="0"/>
+          <a:ext cx="0" cy="0"/>
+          <a:chOff x="0" y="0"/>
+          <a:chExt cx="0" cy="0"/>
+        </a:xfrm>
+      </p:grpSpPr>
+      <p:sp>
+        <p:nvSpPr>
+          <p:cNvPr id="2" name="Заголовок 1"/>
+          <p:cNvSpPr>
+            <a:spLocks noGrp="1"/>
+          </p:cNvSpPr>
+          <p:nvPr>
+            <p:ph type="ctrTitle"/>
+          </p:nvPr>
+        </p:nvSpPr>
+        <p:spPr>
+          <a:xfrm>
+            <a:off x="467544" y="188640"/>
+            <a:ext cx="8136904" cy="648071"/>
+          </a:xfrm>
+        </p:spPr>
+        <p:txBody>
+          <a:bodyPr>
+            <a:normAutofit/>
+          </a:bodyPr>
+          <a:lstStyle/>
+          <a:p>
+            <a:r>
+              <a:rPr lang="ru-RU" sz="3600" dirty="0"/>
+              <a:t>Обзор аналогов</a:t>
+            </a:r>
+          </a:p>
+        </p:txBody>
+      </p:sp>
+      <p:sp>
+        <p:nvSpPr>
+          <p:cNvPr id="3" name="Подзаголовок 2"/>
+          <p:cNvSpPr>
+            <a:spLocks noGrp="1"/>
+          </p:cNvSpPr>
+          <p:nvPr>
+            <p:ph type="subTitle" idx="1"/>
+          </p:nvPr>
+        </p:nvSpPr>
+        <p:spPr>
+          <a:xfrm>
+            <a:off x="498190" y="1340768"/>
+            <a:ext cx="8106258" cy="4896544"/>
+          </a:xfrm>
+        </p:spPr>
+        <p:txBody>
+          <a:bodyPr anchor="t">
+            <a:normAutofit/>
+          </a:bodyPr>
+          <a:lstStyle/>
+          <a:p>
+            <a:pPr algn="l"/>
+            <a:r>
+              <a:rPr lang="ru-RU" sz="2300" dirty="0">
+                <a:solidFill>
+                  <a:schemeClr val="tx1"/>
+                </a:solidFill>
+                <a:latin typeface="Arial" panose="020B0604020202020204" pitchFamily="34" charset="0"/>
+                <a:cs typeface="Arial" panose="020B0604020202020204" pitchFamily="34" charset="0"/>
+              </a:rPr>
+              <a:t>Критерии сравнения:</a:t>
+            </a:r>
+          </a:p>
+          <a:p>
+            <a:pPr indent="449580" algn="just">
+              <a:lnSpc>
+                <a:spcPct val="150000"/>
+              </a:lnSpc>
+            </a:pPr>
+            <a:r>
+              <a:rPr lang="ru-RU" sz="2300" dirty="0">
+                <a:solidFill>
+                  <a:schemeClr val="tx1"/>
+                </a:solidFill>
+                <a:effectLst/>
+                <a:latin typeface="Arial" panose="020B0604020202020204" pitchFamily="34" charset="0"/>
+                <a:ea typeface="Times New Roman" panose="02020603050405020304" pitchFamily="18" charset="0"/>
+                <a:cs typeface="Arial" panose="020B0604020202020204" pitchFamily="34" charset="0"/>
+              </a:rPr>
+              <a:t>1. Удобство использования</a:t>
+            </a:r>
+          </a:p>
+          <a:p>
+            <a:pPr indent="449580" algn="just">
+              <a:lnSpc>
+                <a:spcPct val="150000"/>
+              </a:lnSpc>
+            </a:pPr>
+            <a:r>
+              <a:rPr lang="ru-RU" sz="2300" dirty="0">
+                <a:solidFill>
+                  <a:schemeClr val="tx1"/>
+                </a:solidFill>
+                <a:effectLst/>
+                <a:latin typeface="Arial" panose="020B0604020202020204" pitchFamily="34" charset="0"/>
+                <a:ea typeface="Times New Roman" panose="02020603050405020304" pitchFamily="18" charset="0"/>
+                <a:cs typeface="Arial" panose="020B0604020202020204" pitchFamily="34" charset="0"/>
+              </a:rPr>
+              <a:t>2. Доступность и актуальность данных</a:t>
+            </a:r>
+          </a:p>
+          <a:p>
+            <a:pPr indent="449580" algn="just">
+              <a:lnSpc>
+                <a:spcPct val="150000"/>
+              </a:lnSpc>
+            </a:pPr>
+            <a:r>
+              <a:rPr lang="ru-RU" sz="2300" dirty="0">
+                <a:solidFill>
+                  <a:schemeClr val="tx1"/>
+                </a:solidFill>
+                <a:effectLst/>
+                <a:latin typeface="Arial" panose="020B0604020202020204" pitchFamily="34" charset="0"/>
+                <a:ea typeface="Times New Roman" panose="02020603050405020304" pitchFamily="18" charset="0"/>
+                <a:cs typeface="Arial" panose="020B0604020202020204" pitchFamily="34" charset="0"/>
+              </a:rPr>
+              <a:t>3. Возможности фильтрации и сортировки</a:t>
+            </a:r>
+          </a:p>
+          <a:p>
+            <a:pPr indent="449580" algn="just">
+              <a:lnSpc>
+                <a:spcPct val="150000"/>
+              </a:lnSpc>
+            </a:pPr>
+            <a:r>
+              <a:rPr lang="ru-RU" sz="2300" dirty="0">
+                <a:solidFill>
+                  <a:schemeClr val="tx1"/>
+                </a:solidFill>
+                <a:effectLst/>
+                <a:latin typeface="Arial" panose="020B0604020202020204" pitchFamily="34" charset="0"/>
+                <a:ea typeface="Times New Roman" panose="02020603050405020304" pitchFamily="18" charset="0"/>
+                <a:cs typeface="Arial" panose="020B0604020202020204" pitchFamily="34" charset="0"/>
+              </a:rPr>
+              <a:t>4. Возможность оставлять отзывы и ставить рейтинги</a:t>
+            </a:r>
+          </a:p>
+          <a:p>
+            <a:pPr indent="449580" algn="just">
+              <a:lnSpc>
+                <a:spcPct val="150000"/>
+              </a:lnSpc>
+            </a:pPr>
+            <a:r>
+              <a:rPr lang="ru-RU" sz="2300" dirty="0">
+                <a:solidFill>
+                  <a:schemeClr val="tx1"/>
+                </a:solidFill>
+                <a:effectLst/>
+                <a:latin typeface="Arial" panose="020B0604020202020204" pitchFamily="34" charset="0"/>
+                <a:ea typeface="Times New Roman" panose="02020603050405020304" pitchFamily="18" charset="0"/>
+                <a:cs typeface="Arial" panose="020B0604020202020204" pitchFamily="34" charset="0"/>
+              </a:rPr>
+              <a:t>5. Качество отзывов и рейтингов:</a:t>
+            </a:r>
+          </a:p>
+          <a:p>
+            <a:pPr indent="449580" algn="just">
+              <a:lnSpc>
+                <a:spcPct val="150000"/>
+              </a:lnSpc>
+            </a:pPr>
+            <a:r>
+              <a:rPr lang="ru-RU" sz="2300" dirty="0">
+                <a:solidFill>
+                  <a:schemeClr val="tx1"/>
+                </a:solidFill>
+                <a:latin typeface="Arial" panose="020B0604020202020204" pitchFamily="34" charset="0"/>
+                <a:ea typeface="Times New Roman" panose="02020603050405020304" pitchFamily="18" charset="0"/>
+                <a:cs typeface="Arial" panose="020B0604020202020204" pitchFamily="34" charset="0"/>
+              </a:rPr>
+              <a:t>6</a:t>
+            </a:r>
+            <a:r>
+              <a:rPr lang="ru-RU" sz="2300" dirty="0">
+                <a:solidFill>
+                  <a:schemeClr val="tx1"/>
+                </a:solidFill>
+                <a:effectLst/>
+                <a:latin typeface="Arial" panose="020B0604020202020204" pitchFamily="34" charset="0"/>
+                <a:ea typeface="Times New Roman" panose="02020603050405020304" pitchFamily="18" charset="0"/>
+                <a:cs typeface="Arial" panose="020B0604020202020204" pitchFamily="34" charset="0"/>
+              </a:rPr>
+              <a:t>. Геолокационные функции</a:t>
+            </a:r>
+          </a:p>
+          <a:p>
+            <a:pPr indent="449580" algn="just">
+              <a:lnSpc>
+                <a:spcPct val="150000"/>
+              </a:lnSpc>
+            </a:pPr>
+            <a:r>
+              <a:rPr lang="ru-RU" sz="2300" dirty="0">
+                <a:solidFill>
+                  <a:schemeClr val="tx1"/>
+                </a:solidFill>
+                <a:latin typeface="Arial" panose="020B0604020202020204" pitchFamily="34" charset="0"/>
+                <a:ea typeface="Times New Roman" panose="02020603050405020304" pitchFamily="18" charset="0"/>
+                <a:cs typeface="Arial" panose="020B0604020202020204" pitchFamily="34" charset="0"/>
+              </a:rPr>
+              <a:t>7</a:t>
+            </a:r>
+            <a:r>
+              <a:rPr lang="ru-RU" sz="2300" dirty="0">
+                <a:solidFill>
+                  <a:schemeClr val="tx1"/>
+                </a:solidFill>
+                <a:effectLst/>
+                <a:latin typeface="Arial" panose="020B0604020202020204" pitchFamily="34" charset="0"/>
+                <a:ea typeface="Times New Roman" panose="02020603050405020304" pitchFamily="18" charset="0"/>
+                <a:cs typeface="Arial" panose="020B0604020202020204" pitchFamily="34" charset="0"/>
+              </a:rPr>
+              <a:t>. Сравнение рейтингов</a:t>
+            </a:r>
+          </a:p>
+          <a:p>
+            <a:endParaRPr lang="ru-RU" dirty="0">
+              <a:solidFill>
+                <a:schemeClr val="tx1"/>
+              </a:solidFill>
+            </a:endParaRPr>
+          </a:p>
+          <a:p>
+            <a:pPr algn="l"/>
+            <a:endParaRPr lang="ru-RU" sz="2800" dirty="0">
+              <a:solidFill>
+                <a:schemeClr val="tx1"/>
+              </a:solidFill>
+            </a:endParaRPr>
+          </a:p>
+        </p:txBody>
+      </p:sp>
+      <p:sp>
+        <p:nvSpPr>
+          <p:cNvPr id="4" name="Номер слайда 3">
+            <a:extLst>
+              <a:ext uri="{FF2B5EF4-FFF2-40B4-BE49-F238E27FC236}">
+                <a16:creationId xmlns:a16="http://schemas.microsoft.com/office/drawing/2014/main" id="{4398602D-2EB0-23B2-ADA0-A1E7FC157E1C}"/>
+              </a:ext>
+            </a:extLst>
+          </p:cNvPr>
+          <p:cNvSpPr>
+            <a:spLocks noGrp="1"/>
+          </p:cNvSpPr>
+          <p:nvPr>
+            <p:ph type="sldNum" sz="quarter" idx="12"/>
+          </p:nvPr>
+        </p:nvSpPr>
+        <p:spPr/>
+        <p:txBody>
+          <a:bodyPr/>
+          <a:lstStyle/>
+          <a:p>
+            <a:fld id="{A8D4CE12-0AFA-4111-B533-B38A2B9BBD8D}" type="slidenum">
+              <a:rPr lang="ru-RU" smtClean="0"/>
+              <a:t>11</a:t>
+            </a:fld>
+            <a:endParaRPr lang="ru-RU"/>
+          </a:p>
+        </p:txBody>
+      </p:sp>
+    </p:spTree>
+    <p:extLst>
+      <p:ext uri="{BB962C8B-B14F-4D97-AF65-F5344CB8AC3E}">
+        <p14:creationId xmlns:p14="http://schemas.microsoft.com/office/powerpoint/2010/main" val="3213516774"/>
+      </p:ext>
+    </p:extLst>
+  </p:cSld>
+  <p:clrMapOvr>
+    <a:masterClrMapping/>
+  </p:clrMapOvr>
+</p:sld>
+</file>
+
+<file path=ppt/slides/slide12.xml><?xml version="1.0" encoding="utf-8"?>
 <p:sld xmlns:a="http://schemas.openxmlformats.org/drawingml/2006/main" xmlns:r="http://schemas.openxmlformats.org/officeDocument/2006/relationships" xmlns:p="http://schemas.openxmlformats.org/presentationml/2006/main">
   <p:cSld>
     <p:spTree>
@@ -4676,7 +5156,7 @@
           <a:p>
             <a:fld id="{A8D4CE12-0AFA-4111-B533-B38A2B9BBD8D}" type="slidenum">
               <a:rPr lang="ru-RU" smtClean="0"/>
-              <a:t>10</a:t>
+              <a:t>12</a:t>
             </a:fld>
             <a:endParaRPr lang="ru-RU"/>
           </a:p>
@@ -4695,7 +5175,7 @@
 </p:sld>
 </file>
 
-<file path=ppt/slides/slide11.xml><?xml version="1.0" encoding="utf-8"?>
+<file path=ppt/slides/slide13.xml><?xml version="1.0" encoding="utf-8"?>
 <p:sld xmlns:a="http://schemas.openxmlformats.org/drawingml/2006/main" xmlns:r="http://schemas.openxmlformats.org/officeDocument/2006/relationships" xmlns:p="http://schemas.openxmlformats.org/presentationml/2006/main">
   <p:cSld>
     <p:spTree>
@@ -4829,7 +5309,7 @@
           <a:p>
             <a:fld id="{A8D4CE12-0AFA-4111-B533-B38A2B9BBD8D}" type="slidenum">
               <a:rPr lang="ru-RU" smtClean="0"/>
-              <a:t>11</a:t>
+              <a:t>13</a:t>
             </a:fld>
             <a:endParaRPr lang="ru-RU"/>
           </a:p>
@@ -4848,7 +5328,7 @@
 </p:sld>
 </file>
 
-<file path=ppt/slides/slide12.xml><?xml version="1.0" encoding="utf-8"?>
+<file path=ppt/slides/slide14.xml><?xml version="1.0" encoding="utf-8"?>
 <p:sld xmlns:a="http://schemas.openxmlformats.org/drawingml/2006/main" xmlns:r="http://schemas.openxmlformats.org/officeDocument/2006/relationships" xmlns:p="http://schemas.openxmlformats.org/presentationml/2006/main">
   <p:cSld>
     <p:spTree>
@@ -5062,7 +5542,7 @@
           <a:p>
             <a:fld id="{A8D4CE12-0AFA-4111-B533-B38A2B9BBD8D}" type="slidenum">
               <a:rPr lang="ru-RU" smtClean="0"/>
-              <a:t>12</a:t>
+              <a:t>14</a:t>
             </a:fld>
             <a:endParaRPr lang="ru-RU"/>
           </a:p>
@@ -5081,7 +5561,7 @@
 </p:sld>
 </file>
 
-<file path=ppt/slides/slide13.xml><?xml version="1.0" encoding="utf-8"?>
+<file path=ppt/slides/slide15.xml><?xml version="1.0" encoding="utf-8"?>
 <p:sld xmlns:a="http://schemas.openxmlformats.org/drawingml/2006/main" xmlns:r="http://schemas.openxmlformats.org/officeDocument/2006/relationships" xmlns:p="http://schemas.openxmlformats.org/presentationml/2006/main">
   <p:cSld>
     <p:spTree>
@@ -5230,7 +5710,7 @@
           <a:p>
             <a:fld id="{A8D4CE12-0AFA-4111-B533-B38A2B9BBD8D}" type="slidenum">
               <a:rPr lang="ru-RU" smtClean="0"/>
-              <a:t>13</a:t>
+              <a:t>15</a:t>
             </a:fld>
             <a:endParaRPr lang="ru-RU"/>
           </a:p>
@@ -5249,7 +5729,7 @@
 </p:sld>
 </file>
 
-<file path=ppt/slides/slide14.xml><?xml version="1.0" encoding="utf-8"?>
+<file path=ppt/slides/slide16.xml><?xml version="1.0" encoding="utf-8"?>
 <p:sld xmlns:a="http://schemas.openxmlformats.org/drawingml/2006/main" xmlns:r="http://schemas.openxmlformats.org/officeDocument/2006/relationships" xmlns:p="http://schemas.openxmlformats.org/presentationml/2006/main">
   <p:cSld>
     <p:spTree>
@@ -5393,7 +5873,7 @@
           <a:p>
             <a:fld id="{A8D4CE12-0AFA-4111-B533-B38A2B9BBD8D}" type="slidenum">
               <a:rPr lang="ru-RU" smtClean="0"/>
-              <a:t>14</a:t>
+              <a:t>16</a:t>
             </a:fld>
             <a:endParaRPr lang="ru-RU"/>
           </a:p>
@@ -5412,7 +5892,7 @@
 </p:sld>
 </file>
 
-<file path=ppt/slides/slide15.xml><?xml version="1.0" encoding="utf-8"?>
+<file path=ppt/slides/slide17.xml><?xml version="1.0" encoding="utf-8"?>
 <p:sld xmlns:a="http://schemas.openxmlformats.org/drawingml/2006/main" xmlns:r="http://schemas.openxmlformats.org/officeDocument/2006/relationships" xmlns:p="http://schemas.openxmlformats.org/presentationml/2006/main">
   <p:cSld>
     <p:spTree>
@@ -5564,7 +6044,7 @@
           <a:p>
             <a:fld id="{A8D4CE12-0AFA-4111-B533-B38A2B9BBD8D}" type="slidenum">
               <a:rPr lang="ru-RU" smtClean="0"/>
-              <a:t>15</a:t>
+              <a:t>17</a:t>
             </a:fld>
             <a:endParaRPr lang="ru-RU"/>
           </a:p>
@@ -5583,7 +6063,7 @@
 </p:sld>
 </file>
 
-<file path=ppt/slides/slide16.xml><?xml version="1.0" encoding="utf-8"?>
+<file path=ppt/slides/slide18.xml><?xml version="1.0" encoding="utf-8"?>
 <p:sld xmlns:a="http://schemas.openxmlformats.org/drawingml/2006/main" xmlns:r="http://schemas.openxmlformats.org/officeDocument/2006/relationships" xmlns:p="http://schemas.openxmlformats.org/presentationml/2006/main">
   <p:cSld>
     <p:spTree>
@@ -5652,7 +6132,7 @@
           <a:p>
             <a:fld id="{A8D4CE12-0AFA-4111-B533-B38A2B9BBD8D}" type="slidenum">
               <a:rPr lang="ru-RU" smtClean="0"/>
-              <a:t>16</a:t>
+              <a:t>18</a:t>
             </a:fld>
             <a:endParaRPr lang="ru-RU"/>
           </a:p>
@@ -5726,7 +6206,7 @@
 </p:sld>
 </file>
 
-<file path=ppt/slides/slide17.xml><?xml version="1.0" encoding="utf-8"?>
+<file path=ppt/slides/slide19.xml><?xml version="1.0" encoding="utf-8"?>
 <p:sld xmlns:a="http://schemas.openxmlformats.org/drawingml/2006/main" xmlns:r="http://schemas.openxmlformats.org/officeDocument/2006/relationships" xmlns:p="http://schemas.openxmlformats.org/presentationml/2006/main">
   <p:cSld>
     <p:spTree>
@@ -5795,7 +6275,7 @@
           <a:p>
             <a:fld id="{A8D4CE12-0AFA-4111-B533-B38A2B9BBD8D}" type="slidenum">
               <a:rPr lang="ru-RU" smtClean="0"/>
-              <a:t>17</a:t>
+              <a:t>19</a:t>
             </a:fld>
             <a:endParaRPr lang="ru-RU"/>
           </a:p>
@@ -5869,7 +6349,7 @@
 </p:sld>
 </file>
 
-<file path=ppt/slides/slide18.xml><?xml version="1.0" encoding="utf-8"?>
+<file path=ppt/slides/slide2.xml><?xml version="1.0" encoding="utf-8"?>
 <p:sld xmlns:a="http://schemas.openxmlformats.org/drawingml/2006/main" xmlns:r="http://schemas.openxmlformats.org/officeDocument/2006/relationships" xmlns:p="http://schemas.openxmlformats.org/presentationml/2006/main">
   <p:cSld>
     <p:spTree>
@@ -5898,6 +6378,299 @@
         </p:nvSpPr>
         <p:spPr>
           <a:xfrm>
+            <a:off x="683568" y="188640"/>
+            <a:ext cx="7772400" cy="648071"/>
+          </a:xfrm>
+        </p:spPr>
+        <p:txBody>
+          <a:bodyPr>
+            <a:normAutofit/>
+          </a:bodyPr>
+          <a:lstStyle/>
+          <a:p>
+            <a:r>
+              <a:rPr lang="ru-RU" sz="3600" dirty="0"/>
+              <a:t>Актуальность работы</a:t>
+            </a:r>
+          </a:p>
+        </p:txBody>
+      </p:sp>
+      <p:sp>
+        <p:nvSpPr>
+          <p:cNvPr id="3" name="Подзаголовок 2"/>
+          <p:cNvSpPr>
+            <a:spLocks noGrp="1"/>
+          </p:cNvSpPr>
+          <p:nvPr>
+            <p:ph type="subTitle" idx="1"/>
+          </p:nvPr>
+        </p:nvSpPr>
+        <p:spPr>
+          <a:xfrm>
+            <a:off x="498190" y="1340768"/>
+            <a:ext cx="8106258" cy="4896544"/>
+          </a:xfrm>
+        </p:spPr>
+        <p:txBody>
+          <a:bodyPr anchor="ctr">
+            <a:normAutofit/>
+          </a:bodyPr>
+          <a:lstStyle/>
+          <a:p>
+            <a:pPr algn="l">
+              <a:lnSpc>
+                <a:spcPct val="120000"/>
+              </a:lnSpc>
+              <a:spcBef>
+                <a:spcPts val="600"/>
+              </a:spcBef>
+            </a:pPr>
+            <a:r>
+              <a:rPr lang="ru-RU" sz="2000" b="1" dirty="0">
+                <a:solidFill>
+                  <a:schemeClr val="tx1"/>
+                </a:solidFill>
+                <a:latin typeface="Arial" panose="020B0604020202020204" pitchFamily="34" charset="0"/>
+                <a:cs typeface="Arial" panose="020B0604020202020204" pitchFamily="34" charset="0"/>
+              </a:rPr>
+              <a:t>Разработка веб-сервиса обусловлена:</a:t>
+            </a:r>
+          </a:p>
+          <a:p>
+            <a:pPr marL="457200" indent="-457200" algn="l">
+              <a:lnSpc>
+                <a:spcPct val="120000"/>
+              </a:lnSpc>
+              <a:spcBef>
+                <a:spcPts val="600"/>
+              </a:spcBef>
+              <a:buFont typeface="Arial" panose="020B0604020202020204" pitchFamily="34" charset="0"/>
+              <a:buChar char="•"/>
+            </a:pPr>
+            <a:r>
+              <a:rPr lang="ru-RU" sz="2000" dirty="0">
+                <a:solidFill>
+                  <a:schemeClr val="tx1"/>
+                </a:solidFill>
+                <a:effectLst/>
+                <a:latin typeface="Arial" panose="020B0604020202020204" pitchFamily="34" charset="0"/>
+                <a:ea typeface="Times New Roman" panose="02020603050405020304" pitchFamily="18" charset="0"/>
+                <a:cs typeface="Arial" panose="020B0604020202020204" pitchFamily="34" charset="0"/>
+              </a:rPr>
+              <a:t>растущим спросом на качественное автообслуживание</a:t>
+            </a:r>
+          </a:p>
+          <a:p>
+            <a:pPr marL="457200" indent="-457200" algn="l">
+              <a:lnSpc>
+                <a:spcPct val="120000"/>
+              </a:lnSpc>
+              <a:spcBef>
+                <a:spcPts val="600"/>
+              </a:spcBef>
+              <a:buFont typeface="Arial" panose="020B0604020202020204" pitchFamily="34" charset="0"/>
+              <a:buChar char="•"/>
+            </a:pPr>
+            <a:r>
+              <a:rPr lang="ru-RU" sz="2000" dirty="0">
+                <a:solidFill>
+                  <a:schemeClr val="tx1"/>
+                </a:solidFill>
+                <a:effectLst/>
+                <a:latin typeface="Arial" panose="020B0604020202020204" pitchFamily="34" charset="0"/>
+                <a:ea typeface="Times New Roman" panose="02020603050405020304" pitchFamily="18" charset="0"/>
+                <a:cs typeface="Arial" panose="020B0604020202020204" pitchFamily="34" charset="0"/>
+              </a:rPr>
+              <a:t>повышенной конкуренцией среди автосервисов</a:t>
+            </a:r>
+          </a:p>
+          <a:p>
+            <a:pPr marL="457200" indent="-457200" algn="l">
+              <a:lnSpc>
+                <a:spcPct val="120000"/>
+              </a:lnSpc>
+              <a:spcBef>
+                <a:spcPts val="600"/>
+              </a:spcBef>
+              <a:buFont typeface="Arial" panose="020B0604020202020204" pitchFamily="34" charset="0"/>
+              <a:buChar char="•"/>
+            </a:pPr>
+            <a:r>
+              <a:rPr lang="ru-RU" sz="2000" dirty="0">
+                <a:solidFill>
+                  <a:schemeClr val="tx1"/>
+                </a:solidFill>
+                <a:latin typeface="Arial" panose="020B0604020202020204" pitchFamily="34" charset="0"/>
+                <a:ea typeface="Times New Roman" panose="02020603050405020304" pitchFamily="18" charset="0"/>
+                <a:cs typeface="Arial" panose="020B0604020202020204" pitchFamily="34" charset="0"/>
+              </a:rPr>
+              <a:t>с</a:t>
+            </a:r>
+            <a:r>
+              <a:rPr lang="ru-RU" sz="2000" dirty="0">
+                <a:solidFill>
+                  <a:schemeClr val="tx1"/>
+                </a:solidFill>
+                <a:effectLst/>
+                <a:latin typeface="Arial" panose="020B0604020202020204" pitchFamily="34" charset="0"/>
+                <a:ea typeface="Times New Roman" panose="02020603050405020304" pitchFamily="18" charset="0"/>
+                <a:cs typeface="Arial" panose="020B0604020202020204" pitchFamily="34" charset="0"/>
+              </a:rPr>
+              <a:t>тремлением потребителей получить услуги по оптимальным ценам</a:t>
+            </a:r>
+            <a:endParaRPr lang="en-US" sz="2000" dirty="0">
+              <a:solidFill>
+                <a:schemeClr val="tx1"/>
+              </a:solidFill>
+              <a:effectLst/>
+              <a:latin typeface="Arial" panose="020B0604020202020204" pitchFamily="34" charset="0"/>
+              <a:ea typeface="Times New Roman" panose="02020603050405020304" pitchFamily="18" charset="0"/>
+              <a:cs typeface="Arial" panose="020B0604020202020204" pitchFamily="34" charset="0"/>
+            </a:endParaRPr>
+          </a:p>
+          <a:p>
+            <a:pPr marL="457200" indent="-457200" algn="l">
+              <a:lnSpc>
+                <a:spcPct val="120000"/>
+              </a:lnSpc>
+              <a:spcBef>
+                <a:spcPts val="600"/>
+              </a:spcBef>
+              <a:buFont typeface="Arial" panose="020B0604020202020204" pitchFamily="34" charset="0"/>
+              <a:buChar char="•"/>
+            </a:pPr>
+            <a:r>
+              <a:rPr lang="ru-RU" sz="2000" dirty="0">
+                <a:solidFill>
+                  <a:schemeClr val="tx1"/>
+                </a:solidFill>
+                <a:latin typeface="Arial" panose="020B0604020202020204" pitchFamily="34" charset="0"/>
+                <a:ea typeface="Times New Roman" panose="02020603050405020304" pitchFamily="18" charset="0"/>
+                <a:cs typeface="Arial" panose="020B0604020202020204" pitchFamily="34" charset="0"/>
+              </a:rPr>
+              <a:t>о</a:t>
+            </a:r>
+            <a:r>
+              <a:rPr lang="ru-RU" sz="2000" dirty="0">
+                <a:solidFill>
+                  <a:schemeClr val="tx1"/>
+                </a:solidFill>
+                <a:effectLst/>
+                <a:latin typeface="Arial" panose="020B0604020202020204" pitchFamily="34" charset="0"/>
+                <a:ea typeface="Times New Roman" panose="02020603050405020304" pitchFamily="18" charset="0"/>
+                <a:cs typeface="Arial" panose="020B0604020202020204" pitchFamily="34" charset="0"/>
+              </a:rPr>
+              <a:t>тсутствием уверенности потребителей в достоверности информации об автосервисах</a:t>
+            </a:r>
+          </a:p>
+          <a:p>
+            <a:pPr marL="457200" indent="-457200" algn="l">
+              <a:lnSpc>
+                <a:spcPct val="120000"/>
+              </a:lnSpc>
+              <a:spcBef>
+                <a:spcPts val="600"/>
+              </a:spcBef>
+              <a:buFont typeface="Arial" panose="020B0604020202020204" pitchFamily="34" charset="0"/>
+              <a:buChar char="•"/>
+            </a:pPr>
+            <a:r>
+              <a:rPr lang="ru-RU" sz="2000" dirty="0">
+                <a:solidFill>
+                  <a:schemeClr val="tx1"/>
+                </a:solidFill>
+                <a:latin typeface="Arial" panose="020B0604020202020204" pitchFamily="34" charset="0"/>
+                <a:ea typeface="Times New Roman" panose="02020603050405020304" pitchFamily="18" charset="0"/>
+                <a:cs typeface="Arial" panose="020B0604020202020204" pitchFamily="34" charset="0"/>
+              </a:rPr>
+              <a:t>п</a:t>
+            </a:r>
+            <a:r>
+              <a:rPr lang="ru-RU" sz="2000" dirty="0">
+                <a:solidFill>
+                  <a:schemeClr val="tx1"/>
+                </a:solidFill>
+                <a:effectLst/>
+                <a:latin typeface="Arial" panose="020B0604020202020204" pitchFamily="34" charset="0"/>
+                <a:ea typeface="Times New Roman" panose="02020603050405020304" pitchFamily="18" charset="0"/>
+                <a:cs typeface="Arial" panose="020B0604020202020204" pitchFamily="34" charset="0"/>
+              </a:rPr>
+              <a:t>отребностью потребителей в понятном интерфейсе, адаптированном для различных устройств</a:t>
+            </a:r>
+          </a:p>
+        </p:txBody>
+      </p:sp>
+      <p:sp>
+        <p:nvSpPr>
+          <p:cNvPr id="4" name="Номер слайда 3">
+            <a:extLst>
+              <a:ext uri="{FF2B5EF4-FFF2-40B4-BE49-F238E27FC236}">
+                <a16:creationId xmlns:a16="http://schemas.microsoft.com/office/drawing/2014/main" id="{61DA0F22-A181-B99E-BF69-21A68DF94B38}"/>
+              </a:ext>
+            </a:extLst>
+          </p:cNvPr>
+          <p:cNvSpPr>
+            <a:spLocks noGrp="1"/>
+          </p:cNvSpPr>
+          <p:nvPr>
+            <p:ph type="sldNum" sz="quarter" idx="12"/>
+          </p:nvPr>
+        </p:nvSpPr>
+        <p:spPr/>
+        <p:txBody>
+          <a:bodyPr/>
+          <a:lstStyle/>
+          <a:p>
+            <a:fld id="{A8D4CE12-0AFA-4111-B533-B38A2B9BBD8D}" type="slidenum">
+              <a:rPr lang="ru-RU" smtClean="0"/>
+              <a:t>2</a:t>
+            </a:fld>
+            <a:endParaRPr lang="ru-RU"/>
+          </a:p>
+        </p:txBody>
+      </p:sp>
+    </p:spTree>
+    <p:extLst>
+      <p:ext uri="{BB962C8B-B14F-4D97-AF65-F5344CB8AC3E}">
+        <p14:creationId xmlns:p14="http://schemas.microsoft.com/office/powerpoint/2010/main" val="1053462166"/>
+      </p:ext>
+    </p:extLst>
+  </p:cSld>
+  <p:clrMapOvr>
+    <a:masterClrMapping/>
+  </p:clrMapOvr>
+</p:sld>
+</file>
+
+<file path=ppt/slides/slide20.xml><?xml version="1.0" encoding="utf-8"?>
+<p:sld xmlns:a="http://schemas.openxmlformats.org/drawingml/2006/main" xmlns:r="http://schemas.openxmlformats.org/officeDocument/2006/relationships" xmlns:p="http://schemas.openxmlformats.org/presentationml/2006/main">
+  <p:cSld>
+    <p:spTree>
+      <p:nvGrpSpPr>
+        <p:cNvPr id="1" name=""/>
+        <p:cNvGrpSpPr/>
+        <p:nvPr/>
+      </p:nvGrpSpPr>
+      <p:grpSpPr>
+        <a:xfrm>
+          <a:off x="0" y="0"/>
+          <a:ext cx="0" cy="0"/>
+          <a:chOff x="0" y="0"/>
+          <a:chExt cx="0" cy="0"/>
+        </a:xfrm>
+      </p:grpSpPr>
+      <p:sp>
+        <p:nvSpPr>
+          <p:cNvPr id="2" name="Заголовок 1"/>
+          <p:cNvSpPr>
+            <a:spLocks noGrp="1"/>
+          </p:cNvSpPr>
+          <p:nvPr>
+            <p:ph type="ctrTitle"/>
+          </p:nvPr>
+        </p:nvSpPr>
+        <p:spPr>
+          <a:xfrm>
             <a:off x="467544" y="188640"/>
             <a:ext cx="8136904" cy="504056"/>
           </a:xfrm>
@@ -5938,7 +6711,7 @@
           <a:p>
             <a:fld id="{A8D4CE12-0AFA-4111-B533-B38A2B9BBD8D}" type="slidenum">
               <a:rPr lang="ru-RU" smtClean="0"/>
-              <a:t>18</a:t>
+              <a:t>20</a:t>
             </a:fld>
             <a:endParaRPr lang="ru-RU"/>
           </a:p>
@@ -6012,7 +6785,7 @@
 </p:sld>
 </file>
 
-<file path=ppt/slides/slide19.xml><?xml version="1.0" encoding="utf-8"?>
+<file path=ppt/slides/slide21.xml><?xml version="1.0" encoding="utf-8"?>
 <p:sld xmlns:a="http://schemas.openxmlformats.org/drawingml/2006/main" xmlns:r="http://schemas.openxmlformats.org/officeDocument/2006/relationships" xmlns:p="http://schemas.openxmlformats.org/presentationml/2006/main">
   <p:cSld>
     <p:spTree>
@@ -6081,7 +6854,7 @@
           <a:p>
             <a:fld id="{A8D4CE12-0AFA-4111-B533-B38A2B9BBD8D}" type="slidenum">
               <a:rPr lang="ru-RU" smtClean="0"/>
-              <a:t>19</a:t>
+              <a:t>21</a:t>
             </a:fld>
             <a:endParaRPr lang="ru-RU"/>
           </a:p>
@@ -6155,7 +6928,7 @@
 </p:sld>
 </file>
 
-<file path=ppt/slides/slide2.xml><?xml version="1.0" encoding="utf-8"?>
+<file path=ppt/slides/slide22.xml><?xml version="1.0" encoding="utf-8"?>
 <p:sld xmlns:a="http://schemas.openxmlformats.org/drawingml/2006/main" xmlns:r="http://schemas.openxmlformats.org/officeDocument/2006/relationships" xmlns:p="http://schemas.openxmlformats.org/presentationml/2006/main">
   <p:cSld>
     <p:spTree>
@@ -6174,255 +6947,6 @@
       </p:grpSpPr>
       <p:sp>
         <p:nvSpPr>
-          <p:cNvPr id="2" name="Заголовок 1"/>
-          <p:cNvSpPr>
-            <a:spLocks noGrp="1"/>
-          </p:cNvSpPr>
-          <p:nvPr>
-            <p:ph type="ctrTitle"/>
-          </p:nvPr>
-        </p:nvSpPr>
-        <p:spPr>
-          <a:xfrm>
-            <a:off x="683568" y="188640"/>
-            <a:ext cx="7772400" cy="648071"/>
-          </a:xfrm>
-        </p:spPr>
-        <p:txBody>
-          <a:bodyPr>
-            <a:normAutofit/>
-          </a:bodyPr>
-          <a:lstStyle/>
-          <a:p>
-            <a:r>
-              <a:rPr lang="ru-RU" sz="3600" dirty="0"/>
-              <a:t>Актуальность работы</a:t>
-            </a:r>
-          </a:p>
-        </p:txBody>
-      </p:sp>
-      <p:sp>
-        <p:nvSpPr>
-          <p:cNvPr id="3" name="Подзаголовок 2"/>
-          <p:cNvSpPr>
-            <a:spLocks noGrp="1"/>
-          </p:cNvSpPr>
-          <p:nvPr>
-            <p:ph type="subTitle" idx="1"/>
-          </p:nvPr>
-        </p:nvSpPr>
-        <p:spPr>
-          <a:xfrm>
-            <a:off x="498190" y="1340768"/>
-            <a:ext cx="8106258" cy="4896544"/>
-          </a:xfrm>
-        </p:spPr>
-        <p:txBody>
-          <a:bodyPr anchor="ctr">
-            <a:normAutofit/>
-          </a:bodyPr>
-          <a:lstStyle/>
-          <a:p>
-            <a:pPr algn="l">
-              <a:lnSpc>
-                <a:spcPct val="120000"/>
-              </a:lnSpc>
-              <a:spcBef>
-                <a:spcPts val="600"/>
-              </a:spcBef>
-            </a:pPr>
-            <a:r>
-              <a:rPr lang="ru-RU" sz="2000" b="1" dirty="0">
-                <a:solidFill>
-                  <a:schemeClr val="tx1"/>
-                </a:solidFill>
-                <a:latin typeface="Arial" panose="020B0604020202020204" pitchFamily="34" charset="0"/>
-                <a:cs typeface="Arial" panose="020B0604020202020204" pitchFamily="34" charset="0"/>
-              </a:rPr>
-              <a:t>Разработка веб-сервиса обусловлена:</a:t>
-            </a:r>
-          </a:p>
-          <a:p>
-            <a:pPr marL="457200" indent="-457200" algn="l">
-              <a:lnSpc>
-                <a:spcPct val="120000"/>
-              </a:lnSpc>
-              <a:spcBef>
-                <a:spcPts val="600"/>
-              </a:spcBef>
-              <a:buFont typeface="Arial" panose="020B0604020202020204" pitchFamily="34" charset="0"/>
-              <a:buChar char="•"/>
-            </a:pPr>
-            <a:r>
-              <a:rPr lang="ru-RU" sz="2000" dirty="0">
-                <a:solidFill>
-                  <a:schemeClr val="tx1"/>
-                </a:solidFill>
-                <a:effectLst/>
-                <a:latin typeface="Arial" panose="020B0604020202020204" pitchFamily="34" charset="0"/>
-                <a:ea typeface="Times New Roman" panose="02020603050405020304" pitchFamily="18" charset="0"/>
-                <a:cs typeface="Arial" panose="020B0604020202020204" pitchFamily="34" charset="0"/>
-              </a:rPr>
-              <a:t>растущим спросом на качественное автообслуживание</a:t>
-            </a:r>
-          </a:p>
-          <a:p>
-            <a:pPr marL="457200" indent="-457200" algn="l">
-              <a:lnSpc>
-                <a:spcPct val="120000"/>
-              </a:lnSpc>
-              <a:spcBef>
-                <a:spcPts val="600"/>
-              </a:spcBef>
-              <a:buFont typeface="Arial" panose="020B0604020202020204" pitchFamily="34" charset="0"/>
-              <a:buChar char="•"/>
-            </a:pPr>
-            <a:r>
-              <a:rPr lang="ru-RU" sz="2000" dirty="0">
-                <a:solidFill>
-                  <a:schemeClr val="tx1"/>
-                </a:solidFill>
-                <a:effectLst/>
-                <a:latin typeface="Arial" panose="020B0604020202020204" pitchFamily="34" charset="0"/>
-                <a:ea typeface="Times New Roman" panose="02020603050405020304" pitchFamily="18" charset="0"/>
-                <a:cs typeface="Arial" panose="020B0604020202020204" pitchFamily="34" charset="0"/>
-              </a:rPr>
-              <a:t>повышенной конкуренцией среди автосервисов</a:t>
-            </a:r>
-          </a:p>
-          <a:p>
-            <a:pPr marL="457200" indent="-457200" algn="l">
-              <a:lnSpc>
-                <a:spcPct val="120000"/>
-              </a:lnSpc>
-              <a:spcBef>
-                <a:spcPts val="600"/>
-              </a:spcBef>
-              <a:buFont typeface="Arial" panose="020B0604020202020204" pitchFamily="34" charset="0"/>
-              <a:buChar char="•"/>
-            </a:pPr>
-            <a:r>
-              <a:rPr lang="ru-RU" sz="2000" dirty="0">
-                <a:solidFill>
-                  <a:schemeClr val="tx1"/>
-                </a:solidFill>
-                <a:latin typeface="Arial" panose="020B0604020202020204" pitchFamily="34" charset="0"/>
-                <a:ea typeface="Times New Roman" panose="02020603050405020304" pitchFamily="18" charset="0"/>
-                <a:cs typeface="Arial" panose="020B0604020202020204" pitchFamily="34" charset="0"/>
-              </a:rPr>
-              <a:t>с</a:t>
-            </a:r>
-            <a:r>
-              <a:rPr lang="ru-RU" sz="2000" dirty="0">
-                <a:solidFill>
-                  <a:schemeClr val="tx1"/>
-                </a:solidFill>
-                <a:effectLst/>
-                <a:latin typeface="Arial" panose="020B0604020202020204" pitchFamily="34" charset="0"/>
-                <a:ea typeface="Times New Roman" panose="02020603050405020304" pitchFamily="18" charset="0"/>
-                <a:cs typeface="Arial" panose="020B0604020202020204" pitchFamily="34" charset="0"/>
-              </a:rPr>
-              <a:t>тремлением потребителей получить услуги по оптимальным ценам</a:t>
-            </a:r>
-          </a:p>
-          <a:p>
-            <a:pPr marL="457200" indent="-457200" algn="l">
-              <a:lnSpc>
-                <a:spcPct val="120000"/>
-              </a:lnSpc>
-              <a:spcBef>
-                <a:spcPts val="600"/>
-              </a:spcBef>
-              <a:buFont typeface="Arial" panose="020B0604020202020204" pitchFamily="34" charset="0"/>
-              <a:buChar char="•"/>
-            </a:pPr>
-            <a:r>
-              <a:rPr lang="ru-RU" sz="2000" dirty="0">
-                <a:solidFill>
-                  <a:schemeClr val="tx1"/>
-                </a:solidFill>
-                <a:latin typeface="Arial" panose="020B0604020202020204" pitchFamily="34" charset="0"/>
-                <a:ea typeface="Times New Roman" panose="02020603050405020304" pitchFamily="18" charset="0"/>
-                <a:cs typeface="Arial" panose="020B0604020202020204" pitchFamily="34" charset="0"/>
-              </a:rPr>
-              <a:t>п</a:t>
-            </a:r>
-            <a:r>
-              <a:rPr lang="ru-RU" sz="2000" dirty="0">
-                <a:solidFill>
-                  <a:schemeClr val="tx1"/>
-                </a:solidFill>
-                <a:effectLst/>
-                <a:latin typeface="Arial" panose="020B0604020202020204" pitchFamily="34" charset="0"/>
-                <a:ea typeface="Times New Roman" panose="02020603050405020304" pitchFamily="18" charset="0"/>
-                <a:cs typeface="Arial" panose="020B0604020202020204" pitchFamily="34" charset="0"/>
-              </a:rPr>
-              <a:t>отребностью потребителей в понятном интерфейсе, адаптированном для различных устройств</a:t>
-            </a:r>
-          </a:p>
-        </p:txBody>
-      </p:sp>
-      <p:sp>
-        <p:nvSpPr>
-          <p:cNvPr id="4" name="Номер слайда 3">
-            <a:extLst>
-              <a:ext uri="{FF2B5EF4-FFF2-40B4-BE49-F238E27FC236}">
-                <a16:creationId xmlns:a16="http://schemas.microsoft.com/office/drawing/2014/main" id="{61DA0F22-A181-B99E-BF69-21A68DF94B38}"/>
-              </a:ext>
-            </a:extLst>
-          </p:cNvPr>
-          <p:cNvSpPr>
-            <a:spLocks noGrp="1"/>
-          </p:cNvSpPr>
-          <p:nvPr>
-            <p:ph type="sldNum" sz="quarter" idx="12"/>
-          </p:nvPr>
-        </p:nvSpPr>
-        <p:spPr/>
-        <p:txBody>
-          <a:bodyPr/>
-          <a:lstStyle/>
-          <a:p>
-            <a:fld id="{A8D4CE12-0AFA-4111-B533-B38A2B9BBD8D}" type="slidenum">
-              <a:rPr lang="ru-RU" smtClean="0"/>
-              <a:t>2</a:t>
-            </a:fld>
-            <a:endParaRPr lang="ru-RU"/>
-          </a:p>
-        </p:txBody>
-      </p:sp>
-    </p:spTree>
-    <p:extLst>
-      <p:ext uri="{BB962C8B-B14F-4D97-AF65-F5344CB8AC3E}">
-        <p14:creationId xmlns:p14="http://schemas.microsoft.com/office/powerpoint/2010/main" val="1053462166"/>
-      </p:ext>
-    </p:extLst>
-  </p:cSld>
-  <p:clrMapOvr>
-    <a:masterClrMapping/>
-  </p:clrMapOvr>
-</p:sld>
-</file>
-
-<file path=ppt/slides/slide20.xml><?xml version="1.0" encoding="utf-8"?>
-<p:sld xmlns:a="http://schemas.openxmlformats.org/drawingml/2006/main" xmlns:r="http://schemas.openxmlformats.org/officeDocument/2006/relationships" xmlns:p="http://schemas.openxmlformats.org/presentationml/2006/main">
-  <p:cSld>
-    <p:spTree>
-      <p:nvGrpSpPr>
-        <p:cNvPr id="1" name=""/>
-        <p:cNvGrpSpPr/>
-        <p:nvPr/>
-      </p:nvGrpSpPr>
-      <p:grpSpPr>
-        <a:xfrm>
-          <a:off x="0" y="0"/>
-          <a:ext cx="0" cy="0"/>
-          <a:chOff x="0" y="0"/>
-          <a:chExt cx="0" cy="0"/>
-        </a:xfrm>
-      </p:grpSpPr>
-      <p:sp>
-        <p:nvSpPr>
           <p:cNvPr id="2" name="Заголовок 1">
             <a:extLst>
               <a:ext uri="{FF2B5EF4-FFF2-40B4-BE49-F238E27FC236}">
@@ -6631,7 +7155,7 @@
           <a:p>
             <a:fld id="{A8D4CE12-0AFA-4111-B533-B38A2B9BBD8D}" type="slidenum">
               <a:rPr lang="ru-RU" smtClean="0"/>
-              <a:t>20</a:t>
+              <a:t>22</a:t>
             </a:fld>
             <a:endParaRPr lang="ru-RU"/>
           </a:p>
@@ -6760,8 +7284,37 @@
                 <a:latin typeface="Arial" panose="020B0604020202020204" pitchFamily="34" charset="0"/>
                 <a:cs typeface="Arial" panose="020B0604020202020204" pitchFamily="34" charset="0"/>
               </a:rPr>
-              <a:t>	Отсутствие такой функции значительно увеличивает время, затрачиваемое на поиск подходящего варианта.</a:t>
-            </a:r>
+              <a:t>	</a:t>
+            </a:r>
+            <a:r>
+              <a:rPr lang="ru-RU" sz="2400" dirty="0">
+                <a:solidFill>
+                  <a:srgbClr val="000000"/>
+                </a:solidFill>
+                <a:latin typeface="Arial" panose="020B0604020202020204" pitchFamily="34" charset="0"/>
+                <a:cs typeface="Arial" panose="020B0604020202020204" pitchFamily="34" charset="0"/>
+              </a:rPr>
+              <a:t>М</a:t>
+            </a:r>
+            <a:r>
+              <a:rPr lang="ru-RU" sz="2400" b="0" i="0" dirty="0">
+                <a:solidFill>
+                  <a:srgbClr val="000000"/>
+                </a:solidFill>
+                <a:effectLst/>
+                <a:latin typeface="Arial" panose="020B0604020202020204" pitchFamily="34" charset="0"/>
+                <a:cs typeface="Arial" panose="020B0604020202020204" pitchFamily="34" charset="0"/>
+              </a:rPr>
+              <a:t>ногие владельцы автосервисов могут создавать фейковые отзывы или платить третьим лицам за написание положительных отзывов о своих услугах.</a:t>
+            </a:r>
+            <a:endParaRPr lang="en-US" sz="2400" b="0" i="0" dirty="0">
+              <a:solidFill>
+                <a:srgbClr val="000000"/>
+              </a:solidFill>
+              <a:effectLst/>
+              <a:latin typeface="Arial" panose="020B0604020202020204" pitchFamily="34" charset="0"/>
+              <a:cs typeface="Arial" panose="020B0604020202020204" pitchFamily="34" charset="0"/>
+            </a:endParaRPr>
           </a:p>
         </p:txBody>
       </p:sp>
@@ -7351,7 +7904,7 @@
                 <a:latin typeface="Arial" panose="020B0604020202020204" pitchFamily="34" charset="0"/>
                 <a:cs typeface="Arial" panose="020B0604020202020204" pitchFamily="34" charset="0"/>
               </a:rPr>
-              <a:t>еб-сервис предоставит пользователям удобный инструмент для поиска и </a:t>
+              <a:t>еб-сервис предоставит пользователям удобный и надежный инструмент для поиска и </a:t>
             </a:r>
             <a:r>
               <a:rPr lang="ru-RU" sz="2000" dirty="0">
@@ -7403,7 +7956,17 @@
                 <a:latin typeface="Arial" panose="020B0604020202020204" pitchFamily="34" charset="0"/>
                 <a:cs typeface="Arial" panose="020B0604020202020204" pitchFamily="34" charset="0"/>
               </a:rPr>
-              <a:t>ов России</a:t>
+              <a:t>ов</a:t>
+            </a:r>
+            <a:r>
+              <a:rPr lang="en-US" sz="2000" dirty="0">
+                <a:solidFill>
+                  <a:schemeClr val="tx1"/>
+                </a:solidFill>
+                <a:latin typeface="Arial" panose="020B0604020202020204" pitchFamily="34" charset="0"/>
+                <a:cs typeface="Arial" panose="020B0604020202020204" pitchFamily="34" charset="0"/>
+              </a:rPr>
+              <a:t>,</a:t>
             </a:r>
             <a:r>
               <a:rPr lang="ru-RU" sz="2000" b="0" i="0" dirty="0">
@@ -7414,10 +7977,20 @@
                 <a:latin typeface="Arial" panose="020B0604020202020204" pitchFamily="34" charset="0"/>
                 <a:cs typeface="Arial" panose="020B0604020202020204" pitchFamily="34" charset="0"/>
               </a:rPr>
-              <a:t>. Это позволит потребителям экономить время на поиск и сравнение информации об автосервисах и</a:t>
-            </a:r>
-            <a:r>
-              <a:rPr lang="en-US" sz="2000" b="0" i="0" dirty="0">
+              <a:t> их качестве и надежности. Это позволит потребителям экономить время и</a:t>
+            </a:r>
+            <a:r>
+              <a:rPr lang="ru-RU" sz="2000" dirty="0">
+                <a:solidFill>
+                  <a:schemeClr val="tx1"/>
+                </a:solidFill>
+                <a:latin typeface="Arial" panose="020B0604020202020204" pitchFamily="34" charset="0"/>
+                <a:cs typeface="Arial" panose="020B0604020202020204" pitchFamily="34" charset="0"/>
+              </a:rPr>
+              <a:t> </a:t>
+            </a:r>
+            <a:r>
+              <a:rPr lang="ru-RU" sz="2000" b="0" i="0" dirty="0">
                 <a:solidFill>
                   <a:schemeClr val="tx1"/>
                 </a:solidFill>
@@ -7425,64 +7998,9 @@
                 <a:latin typeface="Arial" panose="020B0604020202020204" pitchFamily="34" charset="0"/>
                 <a:cs typeface="Arial" panose="020B0604020202020204" pitchFamily="34" charset="0"/>
               </a:rPr>
-              <a:t>, </a:t>
-            </a:r>
-            <a:r>
-              <a:rPr lang="ru-RU" sz="2000" b="0" i="0" dirty="0">
-                <a:solidFill>
-                  <a:schemeClr val="tx1"/>
-                </a:solidFill>
-                <a:effectLst/>
-                <a:latin typeface="Arial" panose="020B0604020202020204" pitchFamily="34" charset="0"/>
-                <a:cs typeface="Arial" panose="020B0604020202020204" pitchFamily="34" charset="0"/>
-              </a:rPr>
-              <a:t>основываясь на</a:t>
-            </a:r>
-            <a:r>
-              <a:rPr lang="en-US" sz="2000" b="0" i="0" dirty="0">
-                <a:solidFill>
-                  <a:schemeClr val="tx1"/>
-                </a:solidFill>
-                <a:effectLst/>
-                <a:latin typeface="Arial" panose="020B0604020202020204" pitchFamily="34" charset="0"/>
-                <a:cs typeface="Arial" panose="020B0604020202020204" pitchFamily="34" charset="0"/>
-              </a:rPr>
-              <a:t> </a:t>
-            </a:r>
-            <a:r>
-              <a:rPr lang="ru-RU" sz="2000" b="0" i="0" dirty="0">
-                <a:solidFill>
-                  <a:schemeClr val="tx1"/>
-                </a:solidFill>
-                <a:effectLst/>
-                <a:latin typeface="Arial" panose="020B0604020202020204" pitchFamily="34" charset="0"/>
-                <a:cs typeface="Arial" panose="020B0604020202020204" pitchFamily="34" charset="0"/>
-              </a:rPr>
-              <a:t>этом</a:t>
-            </a:r>
-            <a:r>
-              <a:rPr lang="en-US" sz="2000" b="0" i="0" dirty="0">
-                <a:solidFill>
-                  <a:schemeClr val="tx1"/>
-                </a:solidFill>
-                <a:effectLst/>
-                <a:latin typeface="Arial" panose="020B0604020202020204" pitchFamily="34" charset="0"/>
-                <a:cs typeface="Arial" panose="020B0604020202020204" pitchFamily="34" charset="0"/>
-              </a:rPr>
-              <a:t>, </a:t>
-            </a:r>
-            <a:r>
-              <a:rPr lang="ru-RU" sz="2000" b="0" i="0" dirty="0">
-                <a:solidFill>
-                  <a:schemeClr val="tx1"/>
-                </a:solidFill>
-                <a:effectLst/>
-                <a:latin typeface="Arial" panose="020B0604020202020204" pitchFamily="34" charset="0"/>
-                <a:cs typeface="Arial" panose="020B0604020202020204" pitchFamily="34" charset="0"/>
-              </a:rPr>
-              <a:t>принимать более обоснованные решения при выборе приоритетного.</a:t>
-            </a:r>
-            <a:endParaRPr lang="ru-RU" sz="3600" dirty="0">
+              <a:t>принимать более обоснованные решения при выборе сервиса, основываясь на реальных отзывах и оценках других клиентов.</a:t>
+            </a:r>
+            <a:endParaRPr lang="ru-RU" sz="2000" dirty="0">
               <a:solidFill>
                 <a:schemeClr val="tx1"/>
               </a:solidFill>
@@ -7566,7 +8084,7 @@
         <p:spPr>
           <a:xfrm>
             <a:off x="467544" y="188640"/>
-            <a:ext cx="8136904" cy="648071"/>
+            <a:ext cx="8136904" cy="1271166"/>
           </a:xfrm>
         </p:spPr>
         <p:txBody>
@@ -7577,7 +8095,7 @@
           <a:p>
             <a:r>
               <a:rPr lang="ru-RU" dirty="0"/>
-              <a:t>Как ранее решалась проблема</a:t>
+              <a:t>Как ранее решалась проблема (Выбор приоритетного автосервиса)</a:t>
             </a:r>
           </a:p>
         </p:txBody>
@@ -7604,7 +8122,7 @@
         </p:blipFill>
         <p:spPr>
           <a:xfrm>
-            <a:off x="518871" y="980728"/>
+            <a:off x="518871" y="1459806"/>
             <a:ext cx="8106258" cy="4896544"/>
           </a:xfrm>
           <a:prstGeom prst="rect">
@@ -7684,7 +8202,7 @@
         <p:spPr>
           <a:xfrm>
             <a:off x="467544" y="188640"/>
-            <a:ext cx="8136904" cy="648071"/>
+            <a:ext cx="8136904" cy="1440160"/>
           </a:xfrm>
         </p:spPr>
         <p:txBody>
@@ -7696,6 +8214,13 @@
             <a:r>
               <a:rPr lang="ru-RU" dirty="0"/>
               <a:t>Предлагаемое решение</a:t>
+            </a:r>
+            <a:br>
+              <a:rPr lang="ru-RU" dirty="0"/>
+            </a:br>
+            <a:r>
+              <a:rPr lang="ru-RU" dirty="0"/>
+              <a:t>(Выбор приоритетного автосервиса)</a:t>
             </a:r>
           </a:p>
         </p:txBody>
@@ -7722,7 +8247,7 @@
         </p:blipFill>
         <p:spPr>
           <a:xfrm>
-            <a:off x="518871" y="1340768"/>
+            <a:off x="518871" y="1733550"/>
             <a:ext cx="8106258" cy="3390900"/>
           </a:xfrm>
           <a:prstGeom prst="rect">
@@ -7802,225 +8327,19 @@
         <p:spPr>
           <a:xfrm>
             <a:off x="467544" y="188640"/>
-            <a:ext cx="8136904" cy="648071"/>
+            <a:ext cx="8136904" cy="1271166"/>
           </a:xfrm>
         </p:spPr>
         <p:txBody>
           <a:bodyPr>
-            <a:normAutofit/>
+            <a:normAutofit fontScale="90000"/>
           </a:bodyPr>
           <a:lstStyle/>
           <a:p>
             <a:r>
-              <a:rPr lang="ru-RU" sz="3600" dirty="0"/>
-              <a:t>Обзор аналогов</a:t>
-            </a:r>
-          </a:p>
-        </p:txBody>
-      </p:sp>
-      <p:sp>
-        <p:nvSpPr>
-          <p:cNvPr id="3" name="Подзаголовок 2"/>
-          <p:cNvSpPr>
-            <a:spLocks noGrp="1"/>
-          </p:cNvSpPr>
-          <p:nvPr>
-            <p:ph type="subTitle" idx="1"/>
-          </p:nvPr>
-        </p:nvSpPr>
-        <p:spPr>
-          <a:xfrm>
-            <a:off x="498190" y="1340768"/>
-            <a:ext cx="8106258" cy="4896544"/>
-          </a:xfrm>
-        </p:spPr>
-        <p:txBody>
-          <a:bodyPr anchor="t">
-            <a:normAutofit/>
-          </a:bodyPr>
-          <a:lstStyle/>
-          <a:p>
-            <a:pPr algn="l"/>
-            <a:r>
-              <a:rPr lang="ru-RU" sz="2300" dirty="0">
-                <a:solidFill>
-                  <a:schemeClr val="tx1"/>
-                </a:solidFill>
-                <a:latin typeface="Arial" panose="020B0604020202020204" pitchFamily="34" charset="0"/>
-                <a:cs typeface="Arial" panose="020B0604020202020204" pitchFamily="34" charset="0"/>
-              </a:rPr>
-              <a:t>Критерии сравнения:</a:t>
-            </a:r>
-          </a:p>
-          <a:p>
-            <a:pPr indent="449580" algn="just">
-              <a:lnSpc>
-                <a:spcPct val="150000"/>
-              </a:lnSpc>
-            </a:pPr>
-            <a:r>
-              <a:rPr lang="ru-RU" sz="2300" dirty="0">
-                <a:solidFill>
-                  <a:schemeClr val="tx1"/>
-                </a:solidFill>
-                <a:effectLst/>
-                <a:latin typeface="Arial" panose="020B0604020202020204" pitchFamily="34" charset="0"/>
-                <a:ea typeface="Times New Roman" panose="02020603050405020304" pitchFamily="18" charset="0"/>
-                <a:cs typeface="Arial" panose="020B0604020202020204" pitchFamily="34" charset="0"/>
-              </a:rPr>
-              <a:t>1. Удобство использования</a:t>
-            </a:r>
-          </a:p>
-          <a:p>
-            <a:pPr indent="449580" algn="just">
-              <a:lnSpc>
-                <a:spcPct val="150000"/>
-              </a:lnSpc>
-            </a:pPr>
-            <a:r>
-              <a:rPr lang="ru-RU" sz="2300" dirty="0">
-                <a:solidFill>
-                  <a:schemeClr val="tx1"/>
-                </a:solidFill>
-                <a:effectLst/>
-                <a:latin typeface="Arial" panose="020B0604020202020204" pitchFamily="34" charset="0"/>
-                <a:ea typeface="Times New Roman" panose="02020603050405020304" pitchFamily="18" charset="0"/>
-                <a:cs typeface="Arial" panose="020B0604020202020204" pitchFamily="34" charset="0"/>
-              </a:rPr>
-              <a:t>2. Доступность и актуальность данных</a:t>
-            </a:r>
-          </a:p>
-          <a:p>
-            <a:pPr indent="449580" algn="just">
-              <a:lnSpc>
-                <a:spcPct val="150000"/>
-              </a:lnSpc>
-            </a:pPr>
-            <a:r>
-              <a:rPr lang="ru-RU" sz="2300" dirty="0">
-                <a:solidFill>
-                  <a:schemeClr val="tx1"/>
-                </a:solidFill>
-                <a:effectLst/>
-                <a:latin typeface="Arial" panose="020B0604020202020204" pitchFamily="34" charset="0"/>
-                <a:ea typeface="Times New Roman" panose="02020603050405020304" pitchFamily="18" charset="0"/>
-                <a:cs typeface="Arial" panose="020B0604020202020204" pitchFamily="34" charset="0"/>
-              </a:rPr>
-              <a:t>3. Возможности фильтрации и сортировки</a:t>
-            </a:r>
-          </a:p>
-          <a:p>
-            <a:pPr indent="449580" algn="just">
-              <a:lnSpc>
-                <a:spcPct val="150000"/>
-              </a:lnSpc>
-            </a:pPr>
-            <a:r>
-              <a:rPr lang="ru-RU" sz="2300" dirty="0">
-                <a:solidFill>
-                  <a:schemeClr val="tx1"/>
-                </a:solidFill>
-                <a:effectLst/>
-                <a:latin typeface="Arial" panose="020B0604020202020204" pitchFamily="34" charset="0"/>
-                <a:ea typeface="Times New Roman" panose="02020603050405020304" pitchFamily="18" charset="0"/>
-                <a:cs typeface="Arial" panose="020B0604020202020204" pitchFamily="34" charset="0"/>
-              </a:rPr>
-              <a:t>4. Возможность оставлять отзывы и ставить рейтинги</a:t>
-            </a:r>
-          </a:p>
-          <a:p>
-            <a:pPr indent="449580" algn="just">
-              <a:lnSpc>
-                <a:spcPct val="150000"/>
-              </a:lnSpc>
-            </a:pPr>
-            <a:r>
-              <a:rPr lang="ru-RU" sz="2300" dirty="0">
-                <a:solidFill>
-                  <a:schemeClr val="tx1"/>
-                </a:solidFill>
-                <a:effectLst/>
-                <a:latin typeface="Arial" panose="020B0604020202020204" pitchFamily="34" charset="0"/>
-                <a:ea typeface="Times New Roman" panose="02020603050405020304" pitchFamily="18" charset="0"/>
-                <a:cs typeface="Arial" panose="020B0604020202020204" pitchFamily="34" charset="0"/>
-              </a:rPr>
-              <a:t>5. Качество отзывов и рейтингов:</a:t>
-            </a:r>
-          </a:p>
-          <a:p>
-            <a:pPr indent="449580" algn="just">
-              <a:lnSpc>
-                <a:spcPct val="150000"/>
-              </a:lnSpc>
-            </a:pPr>
-            <a:r>
-              <a:rPr lang="ru-RU" sz="2300" dirty="0">
-                <a:solidFill>
-                  <a:schemeClr val="tx1"/>
-                </a:solidFill>
-                <a:latin typeface="Arial" panose="020B0604020202020204" pitchFamily="34" charset="0"/>
-                <a:ea typeface="Times New Roman" panose="02020603050405020304" pitchFamily="18" charset="0"/>
-                <a:cs typeface="Arial" panose="020B0604020202020204" pitchFamily="34" charset="0"/>
-              </a:rPr>
-              <a:t>6</a:t>
-            </a:r>
-            <a:r>
-              <a:rPr lang="ru-RU" sz="2300" dirty="0">
-                <a:solidFill>
-                  <a:schemeClr val="tx1"/>
-                </a:solidFill>
-                <a:effectLst/>
-                <a:latin typeface="Arial" panose="020B0604020202020204" pitchFamily="34" charset="0"/>
-                <a:ea typeface="Times New Roman" panose="02020603050405020304" pitchFamily="18" charset="0"/>
-                <a:cs typeface="Arial" panose="020B0604020202020204" pitchFamily="34" charset="0"/>
-              </a:rPr>
-              <a:t>. Геолокационные функции</a:t>
-            </a:r>
-          </a:p>
-          <a:p>
-            <a:pPr indent="449580" algn="just">
-              <a:lnSpc>
-                <a:spcPct val="150000"/>
-              </a:lnSpc>
-            </a:pPr>
-            <a:r>
-              <a:rPr lang="ru-RU" sz="2300" dirty="0">
-                <a:solidFill>
-                  <a:schemeClr val="tx1"/>
-                </a:solidFill>
-                <a:latin typeface="Arial" panose="020B0604020202020204" pitchFamily="34" charset="0"/>
-                <a:ea typeface="Times New Roman" panose="02020603050405020304" pitchFamily="18" charset="0"/>
-                <a:cs typeface="Arial" panose="020B0604020202020204" pitchFamily="34" charset="0"/>
-              </a:rPr>
-              <a:t>7</a:t>
-            </a:r>
-            <a:r>
-              <a:rPr lang="ru-RU" sz="2300" dirty="0">
-                <a:solidFill>
-                  <a:schemeClr val="tx1"/>
-                </a:solidFill>
-                <a:effectLst/>
-                <a:latin typeface="Arial" panose="020B0604020202020204" pitchFamily="34" charset="0"/>
-                <a:ea typeface="Times New Roman" panose="02020603050405020304" pitchFamily="18" charset="0"/>
-                <a:cs typeface="Arial" panose="020B0604020202020204" pitchFamily="34" charset="0"/>
-              </a:rPr>
-              <a:t>. Сравнение рейтингов</a:t>
-            </a:r>
-          </a:p>
-          <a:p>
-            <a:endParaRPr lang="ru-RU" dirty="0">
-              <a:solidFill>
-                <a:schemeClr val="tx1"/>
-              </a:solidFill>
-            </a:endParaRPr>
-          </a:p>
-          <a:p>
-            <a:pPr algn="l"/>
-            <a:endParaRPr lang="ru-RU" sz="2800" dirty="0">
-              <a:solidFill>
-                <a:schemeClr val="tx1"/>
-              </a:solidFill>
-            </a:endParaRPr>
+              <a:rPr lang="ru-RU" dirty="0"/>
+              <a:t>Как ранее решалась проблема (Ложные отзывы)</a:t>
+            </a:r>
           </a:p>
         </p:txBody>
       </p:sp>
@@ -8029,7 +8348,7 @@
           <p:cNvPr id="4" name="Номер слайда 3">
             <a:extLst>
               <a:ext uri="{FF2B5EF4-FFF2-40B4-BE49-F238E27FC236}">
-                <a16:creationId xmlns:a16="http://schemas.microsoft.com/office/drawing/2014/main" id="{4398602D-2EB0-23B2-ADA0-A1E7FC157E1C}"/>
+                <a16:creationId xmlns:a16="http://schemas.microsoft.com/office/drawing/2014/main" id="{7A5EFE40-2619-D73C-CFCD-2EF14A132EA0}"/>
               </a:ext>
             </a:extLst>
           </p:cNvPr>
@@ -8053,10 +8372,108 @@
           </a:p>
         </p:txBody>
       </p:sp>
+      <p:sp>
+        <p:nvSpPr>
+          <p:cNvPr id="8" name="TextBox 7">
+            <a:extLst>
+              <a:ext uri="{FF2B5EF4-FFF2-40B4-BE49-F238E27FC236}">
+                <a16:creationId xmlns:a16="http://schemas.microsoft.com/office/drawing/2014/main" id="{860E942F-160B-452B-6643-6ECFF995C529}"/>
+              </a:ext>
+            </a:extLst>
+          </p:cNvPr>
+          <p:cNvSpPr txBox="1"/>
+          <p:nvPr/>
+        </p:nvSpPr>
+        <p:spPr>
+          <a:xfrm>
+            <a:off x="1619672" y="2348880"/>
+            <a:ext cx="5832648" cy="1881990"/>
+          </a:xfrm>
+          <a:prstGeom prst="rect">
+            <a:avLst/>
+          </a:prstGeom>
+          <a:noFill/>
+        </p:spPr>
+        <p:txBody>
+          <a:bodyPr wrap="square">
+            <a:spAutoFit/>
+          </a:bodyPr>
+          <a:lstStyle/>
+          <a:p>
+            <a:pPr>
+              <a:lnSpc>
+                <a:spcPct val="150000"/>
+              </a:lnSpc>
+            </a:pPr>
+            <a:r>
+              <a:rPr lang="ru-RU" sz="2000" i="0" dirty="0">
+                <a:solidFill>
+                  <a:srgbClr val="0D0D0D"/>
+                </a:solidFill>
+                <a:effectLst/>
+                <a:highlight>
+                  <a:srgbClr val="FFFFFF"/>
+                </a:highlight>
+                <a:latin typeface="Arial" panose="020B0604020202020204" pitchFamily="34" charset="0"/>
+                <a:cs typeface="Arial" panose="020B0604020202020204" pitchFamily="34" charset="0"/>
+              </a:rPr>
+              <a:t>1) Анализ текста отзыва с помощью искусственного интеллекта</a:t>
+            </a:r>
+            <a:endParaRPr lang="en-US" sz="2000" i="0" dirty="0">
+              <a:solidFill>
+                <a:srgbClr val="0D0D0D"/>
+              </a:solidFill>
+              <a:effectLst/>
+              <a:highlight>
+                <a:srgbClr val="FFFFFF"/>
+              </a:highlight>
+              <a:latin typeface="Arial" panose="020B0604020202020204" pitchFamily="34" charset="0"/>
+              <a:cs typeface="Arial" panose="020B0604020202020204" pitchFamily="34" charset="0"/>
+            </a:endParaRPr>
+          </a:p>
+          <a:p>
+            <a:pPr>
+              <a:lnSpc>
+                <a:spcPct val="150000"/>
+              </a:lnSpc>
+            </a:pPr>
+            <a:r>
+              <a:rPr lang="en-US" sz="2000" dirty="0">
+                <a:solidFill>
+                  <a:srgbClr val="0D0D0D"/>
+                </a:solidFill>
+                <a:highlight>
+                  <a:srgbClr val="FFFFFF"/>
+                </a:highlight>
+                <a:latin typeface="Arial" panose="020B0604020202020204" pitchFamily="34" charset="0"/>
+                <a:cs typeface="Arial" panose="020B0604020202020204" pitchFamily="34" charset="0"/>
+              </a:rPr>
+              <a:t>2) </a:t>
+            </a:r>
+            <a:r>
+              <a:rPr lang="ru-RU" sz="2000" dirty="0">
+                <a:solidFill>
+                  <a:srgbClr val="0D0D0D"/>
+                </a:solidFill>
+                <a:highlight>
+                  <a:srgbClr val="FFFFFF"/>
+                </a:highlight>
+                <a:latin typeface="Arial" panose="020B0604020202020204" pitchFamily="34" charset="0"/>
+                <a:cs typeface="Arial" panose="020B0604020202020204" pitchFamily="34" charset="0"/>
+              </a:rPr>
+              <a:t>Проверка содержания отзывов командой модераторов</a:t>
+            </a:r>
+            <a:endParaRPr lang="ru-RU" sz="2000" dirty="0">
+              <a:latin typeface="Arial" panose="020B0604020202020204" pitchFamily="34" charset="0"/>
+              <a:cs typeface="Arial" panose="020B0604020202020204" pitchFamily="34" charset="0"/>
+            </a:endParaRPr>
+          </a:p>
+        </p:txBody>
+      </p:sp>
     </p:spTree>
     <p:extLst>
       <p:ext uri="{BB962C8B-B14F-4D97-AF65-F5344CB8AC3E}">
-        <p14:creationId xmlns:p14="http://schemas.microsoft.com/office/powerpoint/2010/main" val="3213516774"/>
+        <p14:creationId xmlns:p14="http://schemas.microsoft.com/office/powerpoint/2010/main" val="932366863"/>
       </p:ext>
     </p:extLst>
   </p:cSld>

</xml_diff>